<commit_message>
Add wordcloud of companies in attendance
</commit_message>
<xml_diff>
--- a/2016-slides/opening_slides.pptx
+++ b/2016-slides/opening_slides.pptx
@@ -5,7 +5,7 @@
     <p:sldMasterId id="2147483648" r:id="rId1"/>
   </p:sldMasterIdLst>
   <p:notesMasterIdLst>
-    <p:notesMasterId r:id="rId18"/>
+    <p:notesMasterId r:id="rId20"/>
   </p:notesMasterIdLst>
   <p:sldIdLst>
     <p:sldId id="257" r:id="rId2"/>
@@ -14,16 +14,18 @@
     <p:sldId id="260" r:id="rId5"/>
     <p:sldId id="261" r:id="rId6"/>
     <p:sldId id="273" r:id="rId7"/>
-    <p:sldId id="262" r:id="rId8"/>
-    <p:sldId id="263" r:id="rId9"/>
-    <p:sldId id="264" r:id="rId10"/>
-    <p:sldId id="272" r:id="rId11"/>
-    <p:sldId id="266" r:id="rId12"/>
-    <p:sldId id="267" r:id="rId13"/>
-    <p:sldId id="268" r:id="rId14"/>
-    <p:sldId id="274" r:id="rId15"/>
-    <p:sldId id="270" r:id="rId16"/>
-    <p:sldId id="269" r:id="rId17"/>
+    <p:sldId id="275" r:id="rId8"/>
+    <p:sldId id="262" r:id="rId9"/>
+    <p:sldId id="263" r:id="rId10"/>
+    <p:sldId id="264" r:id="rId11"/>
+    <p:sldId id="272" r:id="rId12"/>
+    <p:sldId id="266" r:id="rId13"/>
+    <p:sldId id="267" r:id="rId14"/>
+    <p:sldId id="268" r:id="rId15"/>
+    <p:sldId id="274" r:id="rId16"/>
+    <p:sldId id="276" r:id="rId17"/>
+    <p:sldId id="270" r:id="rId18"/>
+    <p:sldId id="269" r:id="rId19"/>
   </p:sldIdLst>
   <p:sldSz cx="9144000" cy="5143500" type="screen16x9"/>
   <p:notesSz cx="6858000" cy="9144000"/>
@@ -4035,7 +4037,7 @@
       </p:grpSpPr>
       <p:sp>
         <p:nvSpPr>
-          <p:cNvPr id="2" name="Title 1"/>
+          <p:cNvPr id="5" name="Title 4"/>
           <p:cNvSpPr>
             <a:spLocks noGrp="1"/>
           </p:cNvSpPr>
@@ -4049,87 +4051,47 @@
           <a:lstStyle/>
           <a:p>
             <a:r>
-              <a:rPr lang="en-US" dirty="0" smtClean="0"/>
-              <a:t>Logistics</a:t>
+              <a:rPr lang="en-US" dirty="0" err="1" smtClean="0"/>
+              <a:t>aol</a:t>
             </a:r>
             <a:endParaRPr lang="en-US" dirty="0"/>
           </a:p>
         </p:txBody>
       </p:sp>
-      <p:sp>
-        <p:nvSpPr>
-          <p:cNvPr id="4" name="Content Placeholder 3"/>
-          <p:cNvSpPr>
-            <a:spLocks noGrp="1"/>
-          </p:cNvSpPr>
-          <p:nvPr>
-            <p:ph idx="1"/>
-          </p:nvPr>
-        </p:nvSpPr>
-        <p:spPr/>
-        <p:txBody>
-          <a:bodyPr>
-            <a:normAutofit lnSpcReduction="10000"/>
-          </a:bodyPr>
-          <a:lstStyle/>
-          <a:p>
-            <a:r>
-              <a:rPr lang="en-US" dirty="0" err="1" smtClean="0"/>
-              <a:t>WiFi</a:t>
-            </a:r>
-            <a:r>
-              <a:rPr lang="en-US" dirty="0" smtClean="0"/>
-              <a:t> – SSID:  Public</a:t>
-            </a:r>
-          </a:p>
-          <a:p>
-            <a:r>
-              <a:rPr lang="en-US" dirty="0" smtClean="0"/>
-              <a:t>Restrooms</a:t>
-            </a:r>
-          </a:p>
-          <a:p>
-            <a:r>
-              <a:rPr lang="en-US" dirty="0" smtClean="0"/>
-              <a:t>Exits</a:t>
-            </a:r>
-          </a:p>
-          <a:p>
-            <a:r>
-              <a:rPr lang="en-US" dirty="0" smtClean="0"/>
-              <a:t>Live Stream</a:t>
-            </a:r>
-          </a:p>
-          <a:p>
-            <a:r>
-              <a:rPr lang="en-US" dirty="0" smtClean="0"/>
-              <a:t>#</a:t>
-            </a:r>
-            <a:r>
-              <a:rPr lang="en-US" dirty="0" err="1" smtClean="0"/>
-              <a:t>devopsdays</a:t>
-            </a:r>
-            <a:endParaRPr lang="en-US" dirty="0" smtClean="0"/>
-          </a:p>
-          <a:p>
-            <a:r>
-              <a:rPr lang="en-US" dirty="0" err="1" smtClean="0"/>
-              <a:t>devopsdaysdc.org</a:t>
-            </a:r>
-            <a:endParaRPr lang="en-US" dirty="0" smtClean="0"/>
-          </a:p>
-          <a:p>
-            <a:endParaRPr lang="en-US" dirty="0" smtClean="0"/>
-          </a:p>
-          <a:p>
-            <a:endParaRPr lang="en-US" dirty="0"/>
-          </a:p>
-        </p:txBody>
-      </p:sp>
+      <p:pic>
+        <p:nvPicPr>
+          <p:cNvPr id="4" name="Picture 3" descr="Dev Ops DC 2016_Final.png"/>
+          <p:cNvPicPr>
+            <a:picLocks noChangeAspect="1"/>
+          </p:cNvPicPr>
+          <p:nvPr/>
+        </p:nvPicPr>
+        <p:blipFill>
+          <a:blip r:embed="rId2" cstate="print">
+            <a:extLst>
+              <a:ext uri="{28A0092B-C50C-407E-A947-70E740481C1C}">
+                <a14:useLocalDpi xmlns:a14="http://schemas.microsoft.com/office/drawing/2010/main"/>
+              </a:ext>
+            </a:extLst>
+          </a:blip>
+          <a:stretch>
+            <a:fillRect/>
+          </a:stretch>
+        </p:blipFill>
+        <p:spPr>
+          <a:xfrm>
+            <a:off x="2275577" y="-400091"/>
+            <a:ext cx="4592847" cy="5943683"/>
+          </a:xfrm>
+          <a:prstGeom prst="rect">
+            <a:avLst/>
+          </a:prstGeom>
+        </p:spPr>
+      </p:pic>
     </p:spTree>
     <p:extLst>
       <p:ext uri="{BB962C8B-B14F-4D97-AF65-F5344CB8AC3E}">
-        <p14:creationId xmlns:p14="http://schemas.microsoft.com/office/powerpoint/2010/main" val="1369244582"/>
+        <p14:creationId xmlns:p14="http://schemas.microsoft.com/office/powerpoint/2010/main" val="782595959"/>
       </p:ext>
     </p:extLst>
   </p:cSld>
@@ -4180,7 +4142,7 @@
           <a:p>
             <a:r>
               <a:rPr lang="en-US" dirty="0" smtClean="0"/>
-              <a:t>Schedule at a Glance</a:t>
+              <a:t>Logistics</a:t>
             </a:r>
             <a:endParaRPr lang="en-US" dirty="0"/>
           </a:p>
@@ -4188,109 +4150,70 @@
       </p:sp>
       <p:sp>
         <p:nvSpPr>
-          <p:cNvPr id="3" name="Content Placeholder 2"/>
-          <p:cNvSpPr>
-            <a:spLocks noGrp="1"/>
-          </p:cNvSpPr>
-          <p:nvPr>
-            <p:ph sz="half" idx="1"/>
+          <p:cNvPr id="4" name="Content Placeholder 3"/>
+          <p:cNvSpPr>
+            <a:spLocks noGrp="1"/>
+          </p:cNvSpPr>
+          <p:nvPr>
+            <p:ph idx="1"/>
           </p:nvPr>
         </p:nvSpPr>
         <p:spPr/>
         <p:txBody>
           <a:bodyPr>
-            <a:normAutofit/>
+            <a:normAutofit lnSpcReduction="10000"/>
           </a:bodyPr>
           <a:lstStyle/>
           <a:p>
             <a:r>
+              <a:rPr lang="en-US" dirty="0" err="1" smtClean="0"/>
+              <a:t>WiFi</a:t>
+            </a:r>
+            <a:r>
               <a:rPr lang="en-US" dirty="0" smtClean="0"/>
-              <a:t>9:00 – Keynotes</a:t>
-            </a:r>
-          </a:p>
-          <a:p>
-            <a:pPr lvl="1"/>
+              <a:t> – SSID:  Public</a:t>
+            </a:r>
+          </a:p>
+          <a:p>
             <a:r>
               <a:rPr lang="en-US" dirty="0" smtClean="0"/>
-              <a:t>10:25 – Morning Break</a:t>
+              <a:t>Restrooms</a:t>
             </a:r>
           </a:p>
           <a:p>
             <a:r>
               <a:rPr lang="en-US" dirty="0" smtClean="0"/>
-              <a:t>11:55 – Ignite Talks</a:t>
+              <a:t>Exits</a:t>
             </a:r>
           </a:p>
           <a:p>
             <a:r>
               <a:rPr lang="en-US" dirty="0" smtClean="0"/>
-              <a:t>12:25 – Open Space Agenda</a:t>
-            </a:r>
-          </a:p>
-        </p:txBody>
-      </p:sp>
-      <p:sp>
-        <p:nvSpPr>
-          <p:cNvPr id="4" name="Content Placeholder 3"/>
-          <p:cNvSpPr>
-            <a:spLocks noGrp="1"/>
-          </p:cNvSpPr>
-          <p:nvPr>
-            <p:ph sz="half" idx="2"/>
-          </p:nvPr>
-        </p:nvSpPr>
-        <p:spPr/>
-        <p:txBody>
-          <a:bodyPr>
-            <a:normAutofit/>
-          </a:bodyPr>
-          <a:lstStyle/>
-          <a:p>
-            <a:r>
-              <a:rPr lang="en-US" dirty="0"/>
-              <a:t>1:00 – Lunch</a:t>
+              <a:t>Live Stream</a:t>
             </a:r>
           </a:p>
           <a:p>
             <a:r>
               <a:rPr lang="en-US" dirty="0" smtClean="0"/>
-              <a:t>2</a:t>
-            </a:r>
-            <a:r>
-              <a:rPr lang="en-US" dirty="0"/>
-              <a:t>:</a:t>
-            </a:r>
-            <a:r>
-              <a:rPr lang="en-US" dirty="0" smtClean="0"/>
-              <a:t>00 </a:t>
-            </a:r>
-            <a:r>
-              <a:rPr lang="en-US" dirty="0"/>
-              <a:t>– </a:t>
-            </a:r>
-            <a:r>
-              <a:rPr lang="en-US" dirty="0" smtClean="0"/>
-              <a:t>Open Spaces</a:t>
-            </a:r>
-            <a:endParaRPr lang="en-US" dirty="0"/>
-          </a:p>
-          <a:p>
-            <a:r>
-              <a:rPr lang="en-US" dirty="0" smtClean="0"/>
-              <a:t>4:15 </a:t>
-            </a:r>
-            <a:r>
-              <a:rPr lang="en-US" dirty="0"/>
-              <a:t>– </a:t>
+              <a:t>#</a:t>
             </a:r>
             <a:r>
               <a:rPr lang="en-US" dirty="0" err="1" smtClean="0"/>
-              <a:t>DevOpsDays</a:t>
-            </a:r>
-            <a:r>
-              <a:rPr lang="en-US" dirty="0" smtClean="0"/>
-              <a:t> Podcast</a:t>
-            </a:r>
+              <a:t>devopsdays</a:t>
+            </a:r>
+            <a:endParaRPr lang="en-US" dirty="0" smtClean="0"/>
+          </a:p>
+          <a:p>
+            <a:r>
+              <a:rPr lang="en-US" dirty="0" err="1" smtClean="0"/>
+              <a:t>devopsdaysdc.org</a:t>
+            </a:r>
+            <a:endParaRPr lang="en-US" dirty="0" smtClean="0"/>
+          </a:p>
+          <a:p>
+            <a:endParaRPr lang="en-US" dirty="0" smtClean="0"/>
+          </a:p>
+          <a:p>
             <a:endParaRPr lang="en-US" dirty="0"/>
           </a:p>
         </p:txBody>
@@ -4298,7 +4221,7 @@
     </p:spTree>
     <p:extLst>
       <p:ext uri="{BB962C8B-B14F-4D97-AF65-F5344CB8AC3E}">
-        <p14:creationId xmlns:p14="http://schemas.microsoft.com/office/powerpoint/2010/main" val="3875373653"/>
+        <p14:creationId xmlns:p14="http://schemas.microsoft.com/office/powerpoint/2010/main" val="1369244582"/>
       </p:ext>
     </p:extLst>
   </p:cSld>
@@ -4349,72 +4272,138 @@
           <a:p>
             <a:r>
               <a:rPr lang="en-US" dirty="0" smtClean="0"/>
-              <a:t>Staff &amp; Volunteers</a:t>
+              <a:t>Schedule at a Glance</a:t>
             </a:r>
             <a:endParaRPr lang="en-US" dirty="0"/>
           </a:p>
         </p:txBody>
       </p:sp>
-      <p:pic>
-        <p:nvPicPr>
-          <p:cNvPr id="5" name="Content Placeholder 4" descr="Design_Lab_-_Create_Your_Own_T-shirts_Online.png"/>
-          <p:cNvPicPr>
-            <a:picLocks noGrp="1" noChangeAspect="1"/>
-          </p:cNvPicPr>
+      <p:sp>
+        <p:nvSpPr>
+          <p:cNvPr id="3" name="Content Placeholder 2"/>
+          <p:cNvSpPr>
+            <a:spLocks noGrp="1"/>
+          </p:cNvSpPr>
           <p:nvPr>
             <p:ph sz="half" idx="1"/>
           </p:nvPr>
-        </p:nvPicPr>
-        <p:blipFill>
-          <a:blip r:embed="rId2">
-            <a:extLst>
-              <a:ext uri="{28A0092B-C50C-407E-A947-70E740481C1C}">
-                <a14:useLocalDpi xmlns:a14="http://schemas.microsoft.com/office/drawing/2010/main" val="0"/>
-              </a:ext>
-            </a:extLst>
-          </a:blip>
-          <a:srcRect t="6073" b="6073"/>
-          <a:stretch>
-            <a:fillRect/>
-          </a:stretch>
-        </p:blipFill>
-        <p:spPr/>
-      </p:pic>
-      <p:pic>
-        <p:nvPicPr>
-          <p:cNvPr id="6" name="Content Placeholder 5" descr="Design_Lab_-_Create_Your_Own_T-shirts_Online.png"/>
-          <p:cNvPicPr>
-            <a:picLocks noGrp="1" noChangeAspect="1"/>
-          </p:cNvPicPr>
+        </p:nvSpPr>
+        <p:spPr/>
+        <p:txBody>
+          <a:bodyPr>
+            <a:normAutofit/>
+          </a:bodyPr>
+          <a:lstStyle/>
+          <a:p>
+            <a:r>
+              <a:rPr lang="en-US" dirty="0" smtClean="0"/>
+              <a:t>9:00 – Keynotes</a:t>
+            </a:r>
+          </a:p>
+          <a:p>
+            <a:pPr lvl="1"/>
+            <a:r>
+              <a:rPr lang="en-US" dirty="0" smtClean="0"/>
+              <a:t>10:25 – Morning Break</a:t>
+            </a:r>
+          </a:p>
+          <a:p>
+            <a:r>
+              <a:rPr lang="en-US" dirty="0" smtClean="0"/>
+              <a:t>11:55 – Ignite Talks</a:t>
+            </a:r>
+          </a:p>
+          <a:p>
+            <a:r>
+              <a:rPr lang="en-US" dirty="0" smtClean="0"/>
+              <a:t>12:25 – Open Space Agenda</a:t>
+            </a:r>
+          </a:p>
+        </p:txBody>
+      </p:sp>
+      <p:sp>
+        <p:nvSpPr>
+          <p:cNvPr id="4" name="Content Placeholder 3"/>
+          <p:cNvSpPr>
+            <a:spLocks noGrp="1"/>
+          </p:cNvSpPr>
           <p:nvPr>
             <p:ph sz="half" idx="2"/>
           </p:nvPr>
-        </p:nvPicPr>
-        <p:blipFill>
-          <a:blip r:embed="rId3">
-            <a:extLst>
-              <a:ext uri="{28A0092B-C50C-407E-A947-70E740481C1C}">
-                <a14:useLocalDpi xmlns:a14="http://schemas.microsoft.com/office/drawing/2010/main" val="0"/>
-              </a:ext>
-            </a:extLst>
-          </a:blip>
-          <a:srcRect t="5987" b="5987"/>
-          <a:stretch>
-            <a:fillRect/>
-          </a:stretch>
-        </p:blipFill>
-        <p:spPr/>
-      </p:pic>
+        </p:nvSpPr>
+        <p:spPr/>
+        <p:txBody>
+          <a:bodyPr>
+            <a:normAutofit/>
+          </a:bodyPr>
+          <a:lstStyle/>
+          <a:p>
+            <a:r>
+              <a:rPr lang="en-US" dirty="0"/>
+              <a:t>1:00 – Lunch</a:t>
+            </a:r>
+          </a:p>
+          <a:p>
+            <a:r>
+              <a:rPr lang="en-US" dirty="0" smtClean="0"/>
+              <a:t>2</a:t>
+            </a:r>
+            <a:r>
+              <a:rPr lang="en-US" dirty="0"/>
+              <a:t>:</a:t>
+            </a:r>
+            <a:r>
+              <a:rPr lang="en-US" dirty="0" smtClean="0"/>
+              <a:t>00 </a:t>
+            </a:r>
+            <a:r>
+              <a:rPr lang="en-US" dirty="0"/>
+              <a:t>– </a:t>
+            </a:r>
+            <a:r>
+              <a:rPr lang="en-US" dirty="0" smtClean="0"/>
+              <a:t>Open Spaces</a:t>
+            </a:r>
+            <a:endParaRPr lang="en-US" dirty="0"/>
+          </a:p>
+          <a:p>
+            <a:r>
+              <a:rPr lang="en-US" dirty="0" smtClean="0"/>
+              <a:t>4:15 </a:t>
+            </a:r>
+            <a:r>
+              <a:rPr lang="en-US" dirty="0"/>
+              <a:t>– </a:t>
+            </a:r>
+            <a:r>
+              <a:rPr lang="en-US" dirty="0" err="1" smtClean="0"/>
+              <a:t>DevOpsDays</a:t>
+            </a:r>
+            <a:r>
+              <a:rPr lang="en-US" dirty="0" smtClean="0"/>
+              <a:t> Podcast</a:t>
+            </a:r>
+            <a:endParaRPr lang="en-US" dirty="0"/>
+          </a:p>
+        </p:txBody>
+      </p:sp>
     </p:spTree>
     <p:extLst>
       <p:ext uri="{BB962C8B-B14F-4D97-AF65-F5344CB8AC3E}">
-        <p14:creationId xmlns:p14="http://schemas.microsoft.com/office/powerpoint/2010/main" val="1555783727"/>
+        <p14:creationId xmlns:p14="http://schemas.microsoft.com/office/powerpoint/2010/main" val="3875373653"/>
       </p:ext>
     </p:extLst>
   </p:cSld>
   <p:clrMapOvr>
     <a:masterClrMapping/>
   </p:clrMapOvr>
+  <p:timing>
+    <p:tnLst>
+      <p:par>
+        <p:cTn xmlns:p14="http://schemas.microsoft.com/office/powerpoint/2010/main" id="1" dur="indefinite" restart="never" nodeType="tmRoot"/>
+      </p:par>
+    </p:tnLst>
+  </p:timing>
 </p:sld>
 </file>
 
@@ -4451,6 +4440,109 @@
           <a:lstStyle/>
           <a:p>
             <a:r>
+              <a:rPr lang="en-US" dirty="0" smtClean="0"/>
+              <a:t>Staff &amp; Volunteers</a:t>
+            </a:r>
+            <a:endParaRPr lang="en-US" dirty="0"/>
+          </a:p>
+        </p:txBody>
+      </p:sp>
+      <p:pic>
+        <p:nvPicPr>
+          <p:cNvPr id="5" name="Content Placeholder 4" descr="Design_Lab_-_Create_Your_Own_T-shirts_Online.png"/>
+          <p:cNvPicPr>
+            <a:picLocks noGrp="1" noChangeAspect="1"/>
+          </p:cNvPicPr>
+          <p:nvPr>
+            <p:ph sz="half" idx="1"/>
+          </p:nvPr>
+        </p:nvPicPr>
+        <p:blipFill>
+          <a:blip r:embed="rId2">
+            <a:extLst>
+              <a:ext uri="{28A0092B-C50C-407E-A947-70E740481C1C}">
+                <a14:useLocalDpi xmlns:a14="http://schemas.microsoft.com/office/drawing/2010/main" val="0"/>
+              </a:ext>
+            </a:extLst>
+          </a:blip>
+          <a:srcRect t="6073" b="6073"/>
+          <a:stretch>
+            <a:fillRect/>
+          </a:stretch>
+        </p:blipFill>
+        <p:spPr/>
+      </p:pic>
+      <p:pic>
+        <p:nvPicPr>
+          <p:cNvPr id="6" name="Content Placeholder 5" descr="Design_Lab_-_Create_Your_Own_T-shirts_Online.png"/>
+          <p:cNvPicPr>
+            <a:picLocks noGrp="1" noChangeAspect="1"/>
+          </p:cNvPicPr>
+          <p:nvPr>
+            <p:ph sz="half" idx="2"/>
+          </p:nvPr>
+        </p:nvPicPr>
+        <p:blipFill>
+          <a:blip r:embed="rId3">
+            <a:extLst>
+              <a:ext uri="{28A0092B-C50C-407E-A947-70E740481C1C}">
+                <a14:useLocalDpi xmlns:a14="http://schemas.microsoft.com/office/drawing/2010/main" val="0"/>
+              </a:ext>
+            </a:extLst>
+          </a:blip>
+          <a:srcRect t="5987" b="5987"/>
+          <a:stretch>
+            <a:fillRect/>
+          </a:stretch>
+        </p:blipFill>
+        <p:spPr/>
+      </p:pic>
+    </p:spTree>
+    <p:extLst>
+      <p:ext uri="{BB962C8B-B14F-4D97-AF65-F5344CB8AC3E}">
+        <p14:creationId xmlns:p14="http://schemas.microsoft.com/office/powerpoint/2010/main" val="1555783727"/>
+      </p:ext>
+    </p:extLst>
+  </p:cSld>
+  <p:clrMapOvr>
+    <a:masterClrMapping/>
+  </p:clrMapOvr>
+</p:sld>
+</file>
+
+<file path=ppt/slides/slide14.xml><?xml version="1.0" encoding="utf-8"?>
+<p:sld xmlns:a="http://schemas.openxmlformats.org/drawingml/2006/main" xmlns:r="http://schemas.openxmlformats.org/officeDocument/2006/relationships" xmlns:p="http://schemas.openxmlformats.org/presentationml/2006/main">
+  <p:cSld>
+    <p:spTree>
+      <p:nvGrpSpPr>
+        <p:cNvPr id="1" name=""/>
+        <p:cNvGrpSpPr/>
+        <p:nvPr/>
+      </p:nvGrpSpPr>
+      <p:grpSpPr>
+        <a:xfrm>
+          <a:off x="0" y="0"/>
+          <a:ext cx="0" cy="0"/>
+          <a:chOff x="0" y="0"/>
+          <a:chExt cx="0" cy="0"/>
+        </a:xfrm>
+      </p:grpSpPr>
+      <p:sp>
+        <p:nvSpPr>
+          <p:cNvPr id="2" name="Title 1"/>
+          <p:cNvSpPr>
+            <a:spLocks noGrp="1"/>
+          </p:cNvSpPr>
+          <p:nvPr>
+            <p:ph type="title"/>
+          </p:nvPr>
+        </p:nvSpPr>
+        <p:spPr/>
+        <p:txBody>
+          <a:bodyPr/>
+          <a:lstStyle/>
+          <a:p>
+            <a:r>
               <a:rPr lang="en-US" dirty="0" err="1" smtClean="0"/>
               <a:t>Etherpad</a:t>
             </a:r>
@@ -4546,7 +4638,7 @@
 </p:sld>
 </file>
 
-<file path=ppt/slides/slide14.xml><?xml version="1.0" encoding="utf-8"?>
+<file path=ppt/slides/slide15.xml><?xml version="1.0" encoding="utf-8"?>
 <p:sld xmlns:a="http://schemas.openxmlformats.org/drawingml/2006/main" xmlns:r="http://schemas.openxmlformats.org/officeDocument/2006/relationships" xmlns:p="http://schemas.openxmlformats.org/presentationml/2006/main">
   <p:cSld>
     <p:spTree>
@@ -4816,7 +4908,101 @@
 </p:sld>
 </file>
 
-<file path=ppt/slides/slide15.xml><?xml version="1.0" encoding="utf-8"?>
+<file path=ppt/slides/slide16.xml><?xml version="1.0" encoding="utf-8"?>
+<p:sld xmlns:a="http://schemas.openxmlformats.org/drawingml/2006/main" xmlns:r="http://schemas.openxmlformats.org/officeDocument/2006/relationships" xmlns:p="http://schemas.openxmlformats.org/presentationml/2006/main">
+  <p:cSld>
+    <p:spTree>
+      <p:nvGrpSpPr>
+        <p:cNvPr id="1" name=""/>
+        <p:cNvGrpSpPr/>
+        <p:nvPr/>
+      </p:nvGrpSpPr>
+      <p:grpSpPr>
+        <a:xfrm>
+          <a:off x="0" y="0"/>
+          <a:ext cx="0" cy="0"/>
+          <a:chOff x="0" y="0"/>
+          <a:chExt cx="0" cy="0"/>
+        </a:xfrm>
+      </p:grpSpPr>
+      <p:sp>
+        <p:nvSpPr>
+          <p:cNvPr id="2" name="Title 1"/>
+          <p:cNvSpPr>
+            <a:spLocks noGrp="1"/>
+          </p:cNvSpPr>
+          <p:nvPr>
+            <p:ph type="title"/>
+          </p:nvPr>
+        </p:nvSpPr>
+        <p:spPr/>
+        <p:txBody>
+          <a:bodyPr/>
+          <a:lstStyle/>
+          <a:p>
+            <a:endParaRPr lang="en-US"/>
+          </a:p>
+        </p:txBody>
+      </p:sp>
+      <p:pic>
+        <p:nvPicPr>
+          <p:cNvPr id="4" name="Content Placeholder 3" descr="Word_Clouds_for_Kids____ABCya_.png"/>
+          <p:cNvPicPr>
+            <a:picLocks noGrp="1" noChangeAspect="1"/>
+          </p:cNvPicPr>
+          <p:nvPr>
+            <p:ph idx="1"/>
+          </p:nvPr>
+        </p:nvPicPr>
+        <p:blipFill>
+          <a:blip r:embed="rId2">
+            <a:extLst>
+              <a:ext uri="{28A0092B-C50C-407E-A947-70E740481C1C}">
+                <a14:useLocalDpi xmlns:a14="http://schemas.microsoft.com/office/drawing/2010/main" val="0"/>
+              </a:ext>
+            </a:extLst>
+          </a:blip>
+          <a:srcRect l="-100197" r="-100197"/>
+          <a:stretch>
+            <a:fillRect/>
+          </a:stretch>
+        </p:blipFill>
+        <p:spPr>
+          <a:xfrm rot="16200000">
+            <a:off x="-3012002" y="-556431"/>
+            <a:ext cx="15168004" cy="6256363"/>
+          </a:xfrm>
+        </p:spPr>
+      </p:pic>
+    </p:spTree>
+    <p:extLst>
+      <p:ext uri="{BB962C8B-B14F-4D97-AF65-F5344CB8AC3E}">
+        <p14:creationId xmlns:p14="http://schemas.microsoft.com/office/powerpoint/2010/main" val="2325993077"/>
+      </p:ext>
+    </p:extLst>
+  </p:cSld>
+  <p:clrMapOvr>
+    <a:masterClrMapping/>
+  </p:clrMapOvr>
+  <mc:AlternateContent xmlns:mc="http://schemas.openxmlformats.org/markup-compatibility/2006">
+    <mc:Choice xmlns:p14="http://schemas.microsoft.com/office/powerpoint/2010/main" Requires="p14">
+      <p:transition spd="slow" p14:dur="2000" advTm="5000"/>
+    </mc:Choice>
+    <mc:Fallback>
+      <p:transition xmlns:p14="http://schemas.microsoft.com/office/powerpoint/2010/main" spd="slow" advTm="5000"/>
+    </mc:Fallback>
+  </mc:AlternateContent>
+  <p:timing>
+    <p:tnLst>
+      <p:par>
+        <p:cTn xmlns:p14="http://schemas.microsoft.com/office/powerpoint/2010/main" id="1" dur="indefinite" restart="never" nodeType="tmRoot"/>
+      </p:par>
+    </p:tnLst>
+  </p:timing>
+</p:sld>
+</file>
+
+<file path=ppt/slides/slide17.xml><?xml version="1.0" encoding="utf-8"?>
 <p:sld xmlns:a="http://schemas.openxmlformats.org/drawingml/2006/main" xmlns:r="http://schemas.openxmlformats.org/officeDocument/2006/relationships" xmlns:p="http://schemas.openxmlformats.org/presentationml/2006/main">
   <p:cSld>
     <p:spTree>
@@ -4906,7 +5092,7 @@
 </p:sld>
 </file>
 
-<file path=ppt/slides/slide16.xml><?xml version="1.0" encoding="utf-8"?>
+<file path=ppt/slides/slide18.xml><?xml version="1.0" encoding="utf-8"?>
 <p:sld xmlns:a="http://schemas.openxmlformats.org/drawingml/2006/main" xmlns:r="http://schemas.openxmlformats.org/officeDocument/2006/relationships" xmlns:p="http://schemas.openxmlformats.org/presentationml/2006/main">
   <p:cSld>
     <p:spTree>
@@ -5918,6 +6104,119 @@
       </p:grpSpPr>
       <p:sp>
         <p:nvSpPr>
+          <p:cNvPr id="2" name="Title 1"/>
+          <p:cNvSpPr>
+            <a:spLocks noGrp="1"/>
+          </p:cNvSpPr>
+          <p:nvPr>
+            <p:ph type="title"/>
+          </p:nvPr>
+        </p:nvSpPr>
+        <p:spPr/>
+        <p:txBody>
+          <a:bodyPr/>
+          <a:lstStyle/>
+          <a:p>
+            <a:endParaRPr lang="en-US"/>
+          </a:p>
+        </p:txBody>
+      </p:sp>
+      <p:sp>
+        <p:nvSpPr>
+          <p:cNvPr id="3" name="Content Placeholder 2"/>
+          <p:cNvSpPr>
+            <a:spLocks noGrp="1"/>
+          </p:cNvSpPr>
+          <p:nvPr>
+            <p:ph idx="1"/>
+          </p:nvPr>
+        </p:nvSpPr>
+        <p:spPr/>
+        <p:txBody>
+          <a:bodyPr/>
+          <a:lstStyle/>
+          <a:p>
+            <a:endParaRPr lang="en-US"/>
+          </a:p>
+        </p:txBody>
+      </p:sp>
+      <p:pic>
+        <p:nvPicPr>
+          <p:cNvPr id="4" name="Picture 3" descr="Word_Clouds_for_Kids____ABCya_.png"/>
+          <p:cNvPicPr>
+            <a:picLocks noChangeAspect="1"/>
+          </p:cNvPicPr>
+          <p:nvPr/>
+        </p:nvPicPr>
+        <p:blipFill>
+          <a:blip r:embed="rId2">
+            <a:extLst>
+              <a:ext uri="{28A0092B-C50C-407E-A947-70E740481C1C}">
+                <a14:useLocalDpi xmlns:a14="http://schemas.microsoft.com/office/drawing/2010/main" val="0"/>
+              </a:ext>
+            </a:extLst>
+          </a:blip>
+          <a:stretch>
+            <a:fillRect/>
+          </a:stretch>
+        </p:blipFill>
+        <p:spPr>
+          <a:xfrm>
+            <a:off x="1135414" y="0"/>
+            <a:ext cx="6873173" cy="5143500"/>
+          </a:xfrm>
+          <a:prstGeom prst="rect">
+            <a:avLst/>
+          </a:prstGeom>
+        </p:spPr>
+      </p:pic>
+    </p:spTree>
+    <p:extLst>
+      <p:ext uri="{BB962C8B-B14F-4D97-AF65-F5344CB8AC3E}">
+        <p14:creationId xmlns:p14="http://schemas.microsoft.com/office/powerpoint/2010/main" val="4193045475"/>
+      </p:ext>
+    </p:extLst>
+  </p:cSld>
+  <p:clrMapOvr>
+    <a:masterClrMapping/>
+  </p:clrMapOvr>
+  <mc:AlternateContent xmlns:mc="http://schemas.openxmlformats.org/markup-compatibility/2006">
+    <mc:Choice xmlns:p14="http://schemas.microsoft.com/office/powerpoint/2010/main" Requires="p14">
+      <p:transition spd="slow" p14:dur="2000" advTm="5000"/>
+    </mc:Choice>
+    <mc:Fallback>
+      <p:transition xmlns:p14="http://schemas.microsoft.com/office/powerpoint/2010/main" spd="slow" advTm="5000"/>
+    </mc:Fallback>
+  </mc:AlternateContent>
+  <p:timing>
+    <p:tnLst>
+      <p:par>
+        <p:cTn xmlns:p14="http://schemas.microsoft.com/office/powerpoint/2010/main" id="1" dur="indefinite" restart="never" nodeType="tmRoot"/>
+      </p:par>
+    </p:tnLst>
+  </p:timing>
+</p:sld>
+</file>
+
+<file path=ppt/slides/slide8.xml><?xml version="1.0" encoding="utf-8"?>
+<p:sld xmlns:a="http://schemas.openxmlformats.org/drawingml/2006/main" xmlns:r="http://schemas.openxmlformats.org/officeDocument/2006/relationships" xmlns:p="http://schemas.openxmlformats.org/presentationml/2006/main">
+  <p:cSld>
+    <p:spTree>
+      <p:nvGrpSpPr>
+        <p:cNvPr id="1" name=""/>
+        <p:cNvGrpSpPr/>
+        <p:nvPr/>
+      </p:nvGrpSpPr>
+      <p:grpSpPr>
+        <a:xfrm>
+          <a:off x="0" y="0"/>
+          <a:ext cx="0" cy="0"/>
+          <a:chOff x="0" y="0"/>
+          <a:chExt cx="0" cy="0"/>
+        </a:xfrm>
+      </p:grpSpPr>
+      <p:sp>
+        <p:nvSpPr>
           <p:cNvPr id="5" name="Title 4"/>
           <p:cNvSpPr>
             <a:spLocks noGrp="1"/>
@@ -5989,157 +6288,6 @@
 </p:sld>
 </file>
 
-<file path=ppt/slides/slide8.xml><?xml version="1.0" encoding="utf-8"?>
-<p:sld xmlns:a="http://schemas.openxmlformats.org/drawingml/2006/main" xmlns:r="http://schemas.openxmlformats.org/officeDocument/2006/relationships" xmlns:p="http://schemas.openxmlformats.org/presentationml/2006/main">
-  <p:cSld>
-    <p:spTree>
-      <p:nvGrpSpPr>
-        <p:cNvPr id="1" name=""/>
-        <p:cNvGrpSpPr/>
-        <p:nvPr/>
-      </p:nvGrpSpPr>
-      <p:grpSpPr>
-        <a:xfrm>
-          <a:off x="0" y="0"/>
-          <a:ext cx="0" cy="0"/>
-          <a:chOff x="0" y="0"/>
-          <a:chExt cx="0" cy="0"/>
-        </a:xfrm>
-      </p:grpSpPr>
-      <p:sp>
-        <p:nvSpPr>
-          <p:cNvPr id="3" name="Title 2"/>
-          <p:cNvSpPr>
-            <a:spLocks noGrp="1"/>
-          </p:cNvSpPr>
-          <p:nvPr>
-            <p:ph type="title"/>
-          </p:nvPr>
-        </p:nvSpPr>
-        <p:spPr/>
-        <p:txBody>
-          <a:bodyPr/>
-          <a:lstStyle/>
-          <a:p>
-            <a:r>
-              <a:rPr lang="en-US" dirty="0" smtClean="0"/>
-              <a:t>Open Spaces</a:t>
-            </a:r>
-            <a:endParaRPr lang="en-US" dirty="0"/>
-          </a:p>
-        </p:txBody>
-      </p:sp>
-      <p:sp>
-        <p:nvSpPr>
-          <p:cNvPr id="4" name="Content Placeholder 3"/>
-          <p:cNvSpPr>
-            <a:spLocks noGrp="1"/>
-          </p:cNvSpPr>
-          <p:nvPr>
-            <p:ph sz="half" idx="1"/>
-          </p:nvPr>
-        </p:nvSpPr>
-        <p:spPr/>
-        <p:txBody>
-          <a:bodyPr/>
-          <a:lstStyle/>
-          <a:p>
-            <a:r>
-              <a:rPr lang="en-US" dirty="0" smtClean="0"/>
-              <a:t>Initial Conditions</a:t>
-            </a:r>
-          </a:p>
-          <a:p>
-            <a:r>
-              <a:rPr lang="en-US" dirty="0" smtClean="0"/>
-              <a:t>Expected Outcomes</a:t>
-            </a:r>
-          </a:p>
-          <a:p>
-            <a:r>
-              <a:rPr lang="en-US" dirty="0" smtClean="0"/>
-              <a:t>Principles</a:t>
-            </a:r>
-          </a:p>
-          <a:p>
-            <a:r>
-              <a:rPr lang="en-US" dirty="0" smtClean="0"/>
-              <a:t>Law of Mobility</a:t>
-            </a:r>
-          </a:p>
-          <a:p>
-            <a:r>
-              <a:rPr lang="en-US" dirty="0" err="1" smtClean="0"/>
-              <a:t>Frien</a:t>
-            </a:r>
-            <a:r>
-              <a:rPr lang="en-US" dirty="0" smtClean="0"/>
-              <a:t>-DA</a:t>
-            </a:r>
-            <a:endParaRPr lang="en-US" dirty="0"/>
-          </a:p>
-        </p:txBody>
-      </p:sp>
-      <p:sp>
-        <p:nvSpPr>
-          <p:cNvPr id="5" name="Content Placeholder 4"/>
-          <p:cNvSpPr>
-            <a:spLocks noGrp="1"/>
-          </p:cNvSpPr>
-          <p:nvPr>
-            <p:ph sz="half" idx="2"/>
-          </p:nvPr>
-        </p:nvSpPr>
-        <p:spPr/>
-        <p:txBody>
-          <a:bodyPr/>
-          <a:lstStyle/>
-          <a:p>
-            <a:r>
-              <a:rPr lang="en-US" dirty="0" smtClean="0"/>
-              <a:t>Building the Schedule</a:t>
-            </a:r>
-          </a:p>
-          <a:p>
-            <a:r>
-              <a:rPr lang="en-US" dirty="0" smtClean="0"/>
-              <a:t>Facilitators</a:t>
-            </a:r>
-          </a:p>
-          <a:p>
-            <a:r>
-              <a:rPr lang="en-US" dirty="0" smtClean="0"/>
-              <a:t>Scribes</a:t>
-            </a:r>
-          </a:p>
-          <a:p>
-            <a:r>
-              <a:rPr lang="en-US" dirty="0" smtClean="0"/>
-              <a:t>Participants</a:t>
-            </a:r>
-          </a:p>
-          <a:p>
-            <a:r>
-              <a:rPr lang="en-US" dirty="0" smtClean="0"/>
-              <a:t>The spaces</a:t>
-            </a:r>
-            <a:endParaRPr lang="en-US" dirty="0"/>
-          </a:p>
-        </p:txBody>
-      </p:sp>
-    </p:spTree>
-    <p:extLst>
-      <p:ext uri="{BB962C8B-B14F-4D97-AF65-F5344CB8AC3E}">
-        <p14:creationId xmlns:p14="http://schemas.microsoft.com/office/powerpoint/2010/main" val="3660798599"/>
-      </p:ext>
-    </p:extLst>
-  </p:cSld>
-  <p:clrMapOvr>
-    <a:masterClrMapping/>
-  </p:clrMapOvr>
-</p:sld>
-</file>
-
 <file path=ppt/slides/slide9.xml><?xml version="1.0" encoding="utf-8"?>
 <p:sld xmlns:a="http://schemas.openxmlformats.org/drawingml/2006/main" xmlns:r="http://schemas.openxmlformats.org/officeDocument/2006/relationships" xmlns:p="http://schemas.openxmlformats.org/presentationml/2006/main">
   <p:cSld>
@@ -6159,7 +6307,7 @@
       </p:grpSpPr>
       <p:sp>
         <p:nvSpPr>
-          <p:cNvPr id="5" name="Title 4"/>
+          <p:cNvPr id="3" name="Title 2"/>
           <p:cNvSpPr>
             <a:spLocks noGrp="1"/>
           </p:cNvSpPr>
@@ -6173,60 +6321,121 @@
           <a:lstStyle/>
           <a:p>
             <a:r>
+              <a:rPr lang="en-US" dirty="0" smtClean="0"/>
+              <a:t>Open Spaces</a:t>
+            </a:r>
+            <a:endParaRPr lang="en-US" dirty="0"/>
+          </a:p>
+        </p:txBody>
+      </p:sp>
+      <p:sp>
+        <p:nvSpPr>
+          <p:cNvPr id="4" name="Content Placeholder 3"/>
+          <p:cNvSpPr>
+            <a:spLocks noGrp="1"/>
+          </p:cNvSpPr>
+          <p:nvPr>
+            <p:ph sz="half" idx="1"/>
+          </p:nvPr>
+        </p:nvSpPr>
+        <p:spPr/>
+        <p:txBody>
+          <a:bodyPr/>
+          <a:lstStyle/>
+          <a:p>
+            <a:r>
+              <a:rPr lang="en-US" dirty="0" smtClean="0"/>
+              <a:t>Initial Conditions</a:t>
+            </a:r>
+          </a:p>
+          <a:p>
+            <a:r>
+              <a:rPr lang="en-US" dirty="0" smtClean="0"/>
+              <a:t>Expected Outcomes</a:t>
+            </a:r>
+          </a:p>
+          <a:p>
+            <a:r>
+              <a:rPr lang="en-US" dirty="0" smtClean="0"/>
+              <a:t>Principles</a:t>
+            </a:r>
+          </a:p>
+          <a:p>
+            <a:r>
+              <a:rPr lang="en-US" dirty="0" smtClean="0"/>
+              <a:t>Law of Mobility</a:t>
+            </a:r>
+          </a:p>
+          <a:p>
+            <a:r>
               <a:rPr lang="en-US" dirty="0" err="1" smtClean="0"/>
-              <a:t>aol</a:t>
+              <a:t>Frien</a:t>
+            </a:r>
+            <a:r>
+              <a:rPr lang="en-US" dirty="0" smtClean="0"/>
+              <a:t>-DA</a:t>
             </a:r>
             <a:endParaRPr lang="en-US" dirty="0"/>
           </a:p>
         </p:txBody>
       </p:sp>
-      <p:pic>
-        <p:nvPicPr>
-          <p:cNvPr id="4" name="Picture 3" descr="Dev Ops DC 2016_Final.png"/>
-          <p:cNvPicPr>
-            <a:picLocks noChangeAspect="1"/>
-          </p:cNvPicPr>
-          <p:nvPr/>
-        </p:nvPicPr>
-        <p:blipFill>
-          <a:blip r:embed="rId2" cstate="print">
-            <a:extLst>
-              <a:ext uri="{28A0092B-C50C-407E-A947-70E740481C1C}">
-                <a14:useLocalDpi xmlns:a14="http://schemas.microsoft.com/office/drawing/2010/main"/>
-              </a:ext>
-            </a:extLst>
-          </a:blip>
-          <a:stretch>
-            <a:fillRect/>
-          </a:stretch>
-        </p:blipFill>
-        <p:spPr>
-          <a:xfrm>
-            <a:off x="2275577" y="-400091"/>
-            <a:ext cx="4592847" cy="5943683"/>
-          </a:xfrm>
-          <a:prstGeom prst="rect">
-            <a:avLst/>
-          </a:prstGeom>
-        </p:spPr>
-      </p:pic>
+      <p:sp>
+        <p:nvSpPr>
+          <p:cNvPr id="5" name="Content Placeholder 4"/>
+          <p:cNvSpPr>
+            <a:spLocks noGrp="1"/>
+          </p:cNvSpPr>
+          <p:nvPr>
+            <p:ph sz="half" idx="2"/>
+          </p:nvPr>
+        </p:nvSpPr>
+        <p:spPr/>
+        <p:txBody>
+          <a:bodyPr/>
+          <a:lstStyle/>
+          <a:p>
+            <a:r>
+              <a:rPr lang="en-US" dirty="0" smtClean="0"/>
+              <a:t>Building the Schedule</a:t>
+            </a:r>
+          </a:p>
+          <a:p>
+            <a:r>
+              <a:rPr lang="en-US" dirty="0" smtClean="0"/>
+              <a:t>Facilitators</a:t>
+            </a:r>
+          </a:p>
+          <a:p>
+            <a:r>
+              <a:rPr lang="en-US" dirty="0" smtClean="0"/>
+              <a:t>Scribes</a:t>
+            </a:r>
+          </a:p>
+          <a:p>
+            <a:r>
+              <a:rPr lang="en-US" dirty="0" smtClean="0"/>
+              <a:t>Participants</a:t>
+            </a:r>
+          </a:p>
+          <a:p>
+            <a:r>
+              <a:rPr lang="en-US" dirty="0" smtClean="0"/>
+              <a:t>The spaces</a:t>
+            </a:r>
+            <a:endParaRPr lang="en-US" dirty="0"/>
+          </a:p>
+        </p:txBody>
+      </p:sp>
     </p:spTree>
     <p:extLst>
       <p:ext uri="{BB962C8B-B14F-4D97-AF65-F5344CB8AC3E}">
-        <p14:creationId xmlns:p14="http://schemas.microsoft.com/office/powerpoint/2010/main" val="782595959"/>
+        <p14:creationId xmlns:p14="http://schemas.microsoft.com/office/powerpoint/2010/main" val="3660798599"/>
       </p:ext>
     </p:extLst>
   </p:cSld>
   <p:clrMapOvr>
     <a:masterClrMapping/>
   </p:clrMapOvr>
-  <p:timing>
-    <p:tnLst>
-      <p:par>
-        <p:cTn xmlns:p14="http://schemas.microsoft.com/office/powerpoint/2010/main" id="1" dur="indefinite" restart="never" nodeType="tmRoot"/>
-      </p:par>
-    </p:tnLst>
-  </p:timing>
 </p:sld>
 </file>
 

</xml_diff>